<commit_message>
ETL News Project commit
3 independent chains for sources (3 temp tables instead 1).
sklearn & nltk still don't load to docker...
</commit_message>
<xml_diff>
--- a/Project_review.pptx
+++ b/Project_review.pptx
@@ -116,6 +116,9 @@
   <p:extLst>
     <p:ext uri="{EFAFB233-063F-42B5-8137-9DF3F51BA10A}">
       <p15:sldGuideLst xmlns:p15="http://schemas.microsoft.com/office/powerpoint/2012/main"/>
+    </p:ext>
+    <p:ext uri="{2D200454-40CA-4A62-9FC3-DE9A4176ACB9}">
+      <p15:notesGuideLst xmlns:p15="http://schemas.microsoft.com/office/powerpoint/2012/main"/>
     </p:ext>
   </p:extLst>
 </p:presentation>
@@ -7404,7 +7407,8 @@
             </a:r>
           </a:p>
           <a:p>
-            <a:endParaRPr lang="ru-RU" sz="2000" dirty="0"/>
+            <a:pPr lvl="1"/>
+            <a:endParaRPr lang="ru-RU" sz="1600" dirty="0"/>
           </a:p>
           <a:p>
             <a:r>
@@ -7673,47 +7677,12 @@
           <a:chExt cx="0" cy="0"/>
         </a:xfrm>
       </p:grpSpPr>
-      <p:sp>
-        <p:nvSpPr>
-          <p:cNvPr id="2" name="Заголовок 1">
+      <p:pic>
+        <p:nvPicPr>
+          <p:cNvPr id="4" name="Рисунок 3">
             <a:extLst>
               <a:ext uri="{FF2B5EF4-FFF2-40B4-BE49-F238E27FC236}">
-                <a16:creationId xmlns:a16="http://schemas.microsoft.com/office/drawing/2014/main" id="{5E04FDA8-91ED-1494-988A-A945285FDF7C}"/>
-              </a:ext>
-            </a:extLst>
-          </p:cNvPr>
-          <p:cNvSpPr>
-            <a:spLocks noGrp="1"/>
-          </p:cNvSpPr>
-          <p:nvPr>
-            <p:ph type="title"/>
-          </p:nvPr>
-        </p:nvSpPr>
-        <p:spPr/>
-        <p:txBody>
-          <a:bodyPr/>
-          <a:lstStyle/>
-          <a:p>
-            <a:r>
-              <a:rPr lang="ru-RU" b="0" i="0" dirty="0">
-                <a:solidFill>
-                  <a:srgbClr val="000000"/>
-                </a:solidFill>
-                <a:effectLst/>
-                <a:latin typeface="Montserrat" panose="00000500000000000000" pitchFamily="2" charset="-52"/>
-              </a:rPr>
-              <a:t>Схемы/архитектуры</a:t>
-            </a:r>
-            <a:endParaRPr lang="ru-RU" dirty="0"/>
-          </a:p>
-        </p:txBody>
-      </p:sp>
-      <p:pic>
-        <p:nvPicPr>
-          <p:cNvPr id="5" name="Рисунок 4">
-            <a:extLst>
-              <a:ext uri="{FF2B5EF4-FFF2-40B4-BE49-F238E27FC236}">
-                <a16:creationId xmlns:a16="http://schemas.microsoft.com/office/drawing/2014/main" id="{EB38534A-28FE-4175-6D73-6C80A06BA6A7}"/>
+                <a16:creationId xmlns:a16="http://schemas.microsoft.com/office/drawing/2014/main" id="{5E8CF704-44CF-F076-AE51-29CB43E6BA11}"/>
               </a:ext>
             </a:extLst>
           </p:cNvPr>
@@ -7730,14 +7699,49 @@
         </p:blipFill>
         <p:spPr>
           <a:xfrm>
-            <a:off x="3445305" y="1708702"/>
-            <a:ext cx="7753528" cy="4286156"/>
+            <a:off x="2791357" y="1218306"/>
+            <a:ext cx="9439980" cy="5639694"/>
           </a:xfrm>
           <a:prstGeom prst="rect">
             <a:avLst/>
           </a:prstGeom>
         </p:spPr>
       </p:pic>
+      <p:sp>
+        <p:nvSpPr>
+          <p:cNvPr id="2" name="Заголовок 1">
+            <a:extLst>
+              <a:ext uri="{FF2B5EF4-FFF2-40B4-BE49-F238E27FC236}">
+                <a16:creationId xmlns:a16="http://schemas.microsoft.com/office/drawing/2014/main" id="{5E04FDA8-91ED-1494-988A-A945285FDF7C}"/>
+              </a:ext>
+            </a:extLst>
+          </p:cNvPr>
+          <p:cNvSpPr>
+            <a:spLocks noGrp="1"/>
+          </p:cNvSpPr>
+          <p:nvPr>
+            <p:ph type="title"/>
+          </p:nvPr>
+        </p:nvSpPr>
+        <p:spPr/>
+        <p:txBody>
+          <a:bodyPr/>
+          <a:lstStyle/>
+          <a:p>
+            <a:r>
+              <a:rPr lang="ru-RU" b="0" i="0" dirty="0">
+                <a:solidFill>
+                  <a:srgbClr val="000000"/>
+                </a:solidFill>
+                <a:effectLst/>
+                <a:latin typeface="Montserrat" panose="00000500000000000000" pitchFamily="2" charset="-52"/>
+              </a:rPr>
+              <a:t>Схемы/архитектуры</a:t>
+            </a:r>
+            <a:endParaRPr lang="ru-RU" dirty="0"/>
+          </a:p>
+        </p:txBody>
+      </p:sp>
       <p:sp>
         <p:nvSpPr>
           <p:cNvPr id="6" name="Прямоугольник: скругленные углы 5">
@@ -7752,8 +7756,8 @@
         </p:nvSpPr>
         <p:spPr>
           <a:xfrm>
-            <a:off x="5111143" y="1627221"/>
-            <a:ext cx="4155541" cy="4562947"/>
+            <a:off x="5939818" y="1218306"/>
+            <a:ext cx="4155541" cy="5411094"/>
           </a:xfrm>
           <a:prstGeom prst="roundRect">
             <a:avLst/>
@@ -7799,8 +7803,8 @@
         </p:nvSpPr>
         <p:spPr>
           <a:xfrm>
-            <a:off x="9266684" y="3057669"/>
-            <a:ext cx="262550" cy="1738265"/>
+            <a:off x="10152511" y="2705906"/>
+            <a:ext cx="262550" cy="2061369"/>
           </a:xfrm>
           <a:prstGeom prst="rightArrow">
             <a:avLst/>
@@ -7845,8 +7849,8 @@
         </p:nvSpPr>
         <p:spPr>
           <a:xfrm rot="16200000">
-            <a:off x="2990458" y="3529347"/>
-            <a:ext cx="1517788" cy="276999"/>
+            <a:off x="676645" y="3490117"/>
+            <a:ext cx="3972241" cy="837152"/>
           </a:xfrm>
           <a:prstGeom prst="rect">
             <a:avLst/>
@@ -7859,9 +7863,36 @@
           </a:bodyPr>
           <a:lstStyle/>
           <a:p>
-            <a:r>
-              <a:rPr lang="ru-RU" sz="1200" dirty="0"/>
-              <a:t>Временная таблица </a:t>
+            <a:pPr algn="ctr">
+              <a:lnSpc>
+                <a:spcPct val="80000"/>
+              </a:lnSpc>
+            </a:pPr>
+            <a:r>
+              <a:rPr lang="ru-RU" sz="2000" dirty="0"/>
+              <a:t>Временные таблицы </a:t>
+            </a:r>
+          </a:p>
+          <a:p>
+            <a:pPr algn="ctr">
+              <a:lnSpc>
+                <a:spcPct val="80000"/>
+              </a:lnSpc>
+            </a:pPr>
+            <a:r>
+              <a:rPr lang="ru-RU" sz="2000" dirty="0"/>
+              <a:t>(для избежания конфликтов – </a:t>
+            </a:r>
+          </a:p>
+          <a:p>
+            <a:pPr algn="ctr">
+              <a:lnSpc>
+                <a:spcPct val="80000"/>
+              </a:lnSpc>
+            </a:pPr>
+            <a:r>
+              <a:rPr lang="ru-RU" sz="2000" dirty="0"/>
+              <a:t>отдельная для каждого источника)</a:t>
             </a:r>
           </a:p>
         </p:txBody>
@@ -7880,8 +7911,8 @@
         </p:nvSpPr>
         <p:spPr>
           <a:xfrm>
-            <a:off x="658467" y="3065613"/>
-            <a:ext cx="2087116" cy="914400"/>
+            <a:off x="35862" y="2621970"/>
+            <a:ext cx="1438095" cy="1869113"/>
           </a:xfrm>
           <a:prstGeom prst="roundRect">
             <a:avLst/>
@@ -7910,7 +7941,14 @@
             <a:pPr algn="ctr"/>
             <a:r>
               <a:rPr lang="en-US" dirty="0"/>
-              <a:t>Python</a:t>
+              <a:t>Python </a:t>
+            </a:r>
+          </a:p>
+          <a:p>
+            <a:pPr algn="ctr"/>
+            <a:r>
+              <a:rPr lang="en-US" dirty="0"/>
+              <a:t>(web -&gt; csv)</a:t>
             </a:r>
             <a:endParaRPr lang="ru-RU" dirty="0"/>
           </a:p>
@@ -7930,8 +7968,146 @@
         </p:nvSpPr>
         <p:spPr>
           <a:xfrm>
-            <a:off x="2925316" y="2688476"/>
-            <a:ext cx="685536" cy="1738265"/>
+            <a:off x="1576584" y="2687393"/>
+            <a:ext cx="347798" cy="1738265"/>
+          </a:xfrm>
+          <a:prstGeom prst="rightArrow">
+            <a:avLst/>
+          </a:prstGeom>
+        </p:spPr>
+        <p:style>
+          <a:lnRef idx="2">
+            <a:schemeClr val="accent1">
+              <a:shade val="50000"/>
+            </a:schemeClr>
+          </a:lnRef>
+          <a:fillRef idx="1">
+            <a:schemeClr val="accent1"/>
+          </a:fillRef>
+          <a:effectRef idx="0">
+            <a:schemeClr val="accent1"/>
+          </a:effectRef>
+          <a:fontRef idx="minor">
+            <a:schemeClr val="lt1"/>
+          </a:fontRef>
+        </p:style>
+        <p:txBody>
+          <a:bodyPr rtlCol="0" anchor="ctr"/>
+          <a:lstStyle/>
+          <a:p>
+            <a:pPr algn="ctr"/>
+            <a:endParaRPr lang="ru-RU"/>
+          </a:p>
+        </p:txBody>
+      </p:sp>
+      <p:sp>
+        <p:nvSpPr>
+          <p:cNvPr id="11" name="Стрелка: вправо 10">
+            <a:extLst>
+              <a:ext uri="{FF2B5EF4-FFF2-40B4-BE49-F238E27FC236}">
+                <a16:creationId xmlns:a16="http://schemas.microsoft.com/office/drawing/2014/main" id="{DBC50B14-634E-FB24-3950-93E322740C74}"/>
+              </a:ext>
+            </a:extLst>
+          </p:cNvPr>
+          <p:cNvSpPr/>
+          <p:nvPr/>
+        </p:nvSpPr>
+        <p:spPr>
+          <a:xfrm rot="1297359">
+            <a:off x="5578137" y="4265929"/>
+            <a:ext cx="1303333" cy="319457"/>
+          </a:xfrm>
+          <a:prstGeom prst="rightArrow">
+            <a:avLst/>
+          </a:prstGeom>
+        </p:spPr>
+        <p:style>
+          <a:lnRef idx="2">
+            <a:schemeClr val="accent1">
+              <a:shade val="50000"/>
+            </a:schemeClr>
+          </a:lnRef>
+          <a:fillRef idx="1">
+            <a:schemeClr val="accent1"/>
+          </a:fillRef>
+          <a:effectRef idx="0">
+            <a:schemeClr val="accent1"/>
+          </a:effectRef>
+          <a:fontRef idx="minor">
+            <a:schemeClr val="lt1"/>
+          </a:fontRef>
+        </p:style>
+        <p:txBody>
+          <a:bodyPr rtlCol="0" anchor="ctr"/>
+          <a:lstStyle/>
+          <a:p>
+            <a:pPr algn="ctr"/>
+            <a:endParaRPr lang="ru-RU"/>
+          </a:p>
+        </p:txBody>
+      </p:sp>
+      <p:sp>
+        <p:nvSpPr>
+          <p:cNvPr id="12" name="Стрелка: вправо 11">
+            <a:extLst>
+              <a:ext uri="{FF2B5EF4-FFF2-40B4-BE49-F238E27FC236}">
+                <a16:creationId xmlns:a16="http://schemas.microsoft.com/office/drawing/2014/main" id="{C56E624D-204B-85C0-1673-C7AB424DFFB2}"/>
+              </a:ext>
+            </a:extLst>
+          </p:cNvPr>
+          <p:cNvSpPr/>
+          <p:nvPr/>
+        </p:nvSpPr>
+        <p:spPr>
+          <a:xfrm rot="1297359">
+            <a:off x="5578134" y="4617746"/>
+            <a:ext cx="1303333" cy="319457"/>
+          </a:xfrm>
+          <a:prstGeom prst="rightArrow">
+            <a:avLst/>
+          </a:prstGeom>
+        </p:spPr>
+        <p:style>
+          <a:lnRef idx="2">
+            <a:schemeClr val="accent1">
+              <a:shade val="50000"/>
+            </a:schemeClr>
+          </a:lnRef>
+          <a:fillRef idx="1">
+            <a:schemeClr val="accent1"/>
+          </a:fillRef>
+          <a:effectRef idx="0">
+            <a:schemeClr val="accent1"/>
+          </a:effectRef>
+          <a:fontRef idx="minor">
+            <a:schemeClr val="lt1"/>
+          </a:fontRef>
+        </p:style>
+        <p:txBody>
+          <a:bodyPr rtlCol="0" anchor="ctr"/>
+          <a:lstStyle/>
+          <a:p>
+            <a:pPr algn="ctr"/>
+            <a:endParaRPr lang="ru-RU"/>
+          </a:p>
+        </p:txBody>
+      </p:sp>
+      <p:sp>
+        <p:nvSpPr>
+          <p:cNvPr id="13" name="Стрелка: вправо 12">
+            <a:extLst>
+              <a:ext uri="{FF2B5EF4-FFF2-40B4-BE49-F238E27FC236}">
+                <a16:creationId xmlns:a16="http://schemas.microsoft.com/office/drawing/2014/main" id="{BDFEEDDC-2E04-3E71-9D9D-CA6AFA00D67E}"/>
+              </a:ext>
+            </a:extLst>
+          </p:cNvPr>
+          <p:cNvSpPr/>
+          <p:nvPr/>
+        </p:nvSpPr>
+        <p:spPr>
+          <a:xfrm rot="1297359">
+            <a:off x="5578136" y="4996170"/>
+            <a:ext cx="1303333" cy="319457"/>
           </a:xfrm>
           <a:prstGeom prst="rightArrow">
             <a:avLst/>

</xml_diff>